<commit_message>
Fixed inaccuracies in documentation
</commit_message>
<xml_diff>
--- a/защита/CryptoDog.pptx
+++ b/защита/CryptoDog.pptx
@@ -276,7 +276,7 @@
           <a:p>
             <a:fld id="{4F3296BC-0369-43A9-BF9C-2419B90DEAB9}" type="datetimeFigureOut">
               <a:rPr lang="ru-RU" smtClean="0"/>
-              <a:t>04.11.2023</a:t>
+              <a:t>05.11.2023</a:t>
             </a:fld>
             <a:endParaRPr lang="ru-RU"/>
           </a:p>
@@ -476,7 +476,7 @@
           <a:p>
             <a:fld id="{4F3296BC-0369-43A9-BF9C-2419B90DEAB9}" type="datetimeFigureOut">
               <a:rPr lang="ru-RU" smtClean="0"/>
-              <a:t>04.11.2023</a:t>
+              <a:t>05.11.2023</a:t>
             </a:fld>
             <a:endParaRPr lang="ru-RU"/>
           </a:p>
@@ -686,7 +686,7 @@
           <a:p>
             <a:fld id="{4F3296BC-0369-43A9-BF9C-2419B90DEAB9}" type="datetimeFigureOut">
               <a:rPr lang="ru-RU" smtClean="0"/>
-              <a:t>04.11.2023</a:t>
+              <a:t>05.11.2023</a:t>
             </a:fld>
             <a:endParaRPr lang="ru-RU"/>
           </a:p>
@@ -886,7 +886,7 @@
           <a:p>
             <a:fld id="{4F3296BC-0369-43A9-BF9C-2419B90DEAB9}" type="datetimeFigureOut">
               <a:rPr lang="ru-RU" smtClean="0"/>
-              <a:t>04.11.2023</a:t>
+              <a:t>05.11.2023</a:t>
             </a:fld>
             <a:endParaRPr lang="ru-RU"/>
           </a:p>
@@ -1162,7 +1162,7 @@
           <a:p>
             <a:fld id="{4F3296BC-0369-43A9-BF9C-2419B90DEAB9}" type="datetimeFigureOut">
               <a:rPr lang="ru-RU" smtClean="0"/>
-              <a:t>04.11.2023</a:t>
+              <a:t>05.11.2023</a:t>
             </a:fld>
             <a:endParaRPr lang="ru-RU"/>
           </a:p>
@@ -1430,7 +1430,7 @@
           <a:p>
             <a:fld id="{4F3296BC-0369-43A9-BF9C-2419B90DEAB9}" type="datetimeFigureOut">
               <a:rPr lang="ru-RU" smtClean="0"/>
-              <a:t>04.11.2023</a:t>
+              <a:t>05.11.2023</a:t>
             </a:fld>
             <a:endParaRPr lang="ru-RU"/>
           </a:p>
@@ -1845,7 +1845,7 @@
           <a:p>
             <a:fld id="{4F3296BC-0369-43A9-BF9C-2419B90DEAB9}" type="datetimeFigureOut">
               <a:rPr lang="ru-RU" smtClean="0"/>
-              <a:t>04.11.2023</a:t>
+              <a:t>05.11.2023</a:t>
             </a:fld>
             <a:endParaRPr lang="ru-RU"/>
           </a:p>
@@ -1987,7 +1987,7 @@
           <a:p>
             <a:fld id="{4F3296BC-0369-43A9-BF9C-2419B90DEAB9}" type="datetimeFigureOut">
               <a:rPr lang="ru-RU" smtClean="0"/>
-              <a:t>04.11.2023</a:t>
+              <a:t>05.11.2023</a:t>
             </a:fld>
             <a:endParaRPr lang="ru-RU"/>
           </a:p>
@@ -2100,7 +2100,7 @@
           <a:p>
             <a:fld id="{4F3296BC-0369-43A9-BF9C-2419B90DEAB9}" type="datetimeFigureOut">
               <a:rPr lang="ru-RU" smtClean="0"/>
-              <a:t>04.11.2023</a:t>
+              <a:t>05.11.2023</a:t>
             </a:fld>
             <a:endParaRPr lang="ru-RU"/>
           </a:p>
@@ -2413,7 +2413,7 @@
           <a:p>
             <a:fld id="{4F3296BC-0369-43A9-BF9C-2419B90DEAB9}" type="datetimeFigureOut">
               <a:rPr lang="ru-RU" smtClean="0"/>
-              <a:t>04.11.2023</a:t>
+              <a:t>05.11.2023</a:t>
             </a:fld>
             <a:endParaRPr lang="ru-RU"/>
           </a:p>
@@ -2702,7 +2702,7 @@
           <a:p>
             <a:fld id="{4F3296BC-0369-43A9-BF9C-2419B90DEAB9}" type="datetimeFigureOut">
               <a:rPr lang="ru-RU" smtClean="0"/>
-              <a:t>04.11.2023</a:t>
+              <a:t>05.11.2023</a:t>
             </a:fld>
             <a:endParaRPr lang="ru-RU"/>
           </a:p>
@@ -2945,7 +2945,7 @@
           <a:p>
             <a:fld id="{4F3296BC-0369-43A9-BF9C-2419B90DEAB9}" type="datetimeFigureOut">
               <a:rPr lang="ru-RU" smtClean="0"/>
-              <a:t>04.11.2023</a:t>
+              <a:t>05.11.2023</a:t>
             </a:fld>
             <a:endParaRPr lang="ru-RU"/>
           </a:p>
@@ -4940,23 +4940,20 @@
                 <a:ea typeface="Cascadia Code" panose="020B0609020000020004" pitchFamily="49" charset="0"/>
                 <a:cs typeface="Cascadia Code" panose="020B0609020000020004" pitchFamily="49" charset="0"/>
               </a:rPr>
-              <a:t> на основе утилиты Gpg4win и криптографический инструмент шифрования данных. </a:t>
-            </a:r>
-            <a:r>
-              <a:rPr lang="ru-RU" dirty="0" err="1">
-                <a:latin typeface="Cascadia Code" panose="020B0609020000020004" pitchFamily="49" charset="0"/>
-                <a:ea typeface="Cascadia Code" panose="020B0609020000020004" pitchFamily="49" charset="0"/>
-                <a:cs typeface="Cascadia Code" panose="020B0609020000020004" pitchFamily="49" charset="0"/>
-              </a:rPr>
-              <a:t>CryptoDog</a:t>
-            </a:r>
+              <a:t> на основе утилиты Gpg4win и криптографический инструмент шифрования данных</a:t>
+            </a:r>
+          </a:p>
+          <a:p>
+            <a:pPr marL="0" indent="0">
+              <a:buNone/>
+            </a:pPr>
             <a:r>
               <a:rPr lang="ru-RU" dirty="0">
                 <a:latin typeface="Cascadia Code" panose="020B0609020000020004" pitchFamily="49" charset="0"/>
                 <a:ea typeface="Cascadia Code" panose="020B0609020000020004" pitchFamily="49" charset="0"/>
                 <a:cs typeface="Cascadia Code" panose="020B0609020000020004" pitchFamily="49" charset="0"/>
               </a:rPr>
-              <a:t> предоставляет набор функционала в области криптографии и шифрования необходимый среднестатистическому пользователю.</a:t>
+              <a:t>Предоставляет набор функционала в области криптографии и шифрования необходимый среднестатистическому пользователю</a:t>
             </a:r>
           </a:p>
         </p:txBody>
@@ -5023,7 +5020,7 @@
                 <a:ea typeface="Cascadia Code" panose="020B0609020000020004" pitchFamily="49" charset="0"/>
                 <a:cs typeface="Cascadia Code" panose="020B0609020000020004" pitchFamily="49" charset="0"/>
               </a:rPr>
-              <a:t>Скрины</a:t>
+              <a:t>Скриншоты</a:t>
             </a:r>
           </a:p>
         </p:txBody>

</xml_diff>